<commit_message>
minor corrections in Exercices pptx
</commit_message>
<xml_diff>
--- a/02 - Exercices SQL.pptx
+++ b/02 - Exercices SQL.pptx
@@ -220,7 +220,7 @@
           <a:p>
             <a:fld id="{5E73C5D7-919D-4BDD-AE43-DC3A70FDFE9F}" type="datetimeFigureOut">
               <a:rPr lang="fr-BE" smtClean="0"/>
-              <a:t>05-01-23</a:t>
+              <a:t>10-01-23</a:t>
             </a:fld>
             <a:endParaRPr lang="fr-BE"/>
           </a:p>
@@ -637,7 +637,7 @@
           <a:p>
             <a:fld id="{47F13D19-8A6F-448B-8613-9530819FB28C}" type="datetimeFigureOut">
               <a:rPr lang="fr-BE" smtClean="0"/>
-              <a:t>05-01-23</a:t>
+              <a:t>10-01-23</a:t>
             </a:fld>
             <a:endParaRPr lang="fr-BE"/>
           </a:p>
@@ -837,7 +837,7 @@
           <a:p>
             <a:fld id="{47F13D19-8A6F-448B-8613-9530819FB28C}" type="datetimeFigureOut">
               <a:rPr lang="fr-BE" smtClean="0"/>
-              <a:t>05-01-23</a:t>
+              <a:t>10-01-23</a:t>
             </a:fld>
             <a:endParaRPr lang="fr-BE"/>
           </a:p>
@@ -1047,7 +1047,7 @@
           <a:p>
             <a:fld id="{47F13D19-8A6F-448B-8613-9530819FB28C}" type="datetimeFigureOut">
               <a:rPr lang="fr-BE" smtClean="0"/>
-              <a:t>05-01-23</a:t>
+              <a:t>10-01-23</a:t>
             </a:fld>
             <a:endParaRPr lang="fr-BE"/>
           </a:p>
@@ -1247,7 +1247,7 @@
           <a:p>
             <a:fld id="{47F13D19-8A6F-448B-8613-9530819FB28C}" type="datetimeFigureOut">
               <a:rPr lang="fr-BE" smtClean="0"/>
-              <a:t>05-01-23</a:t>
+              <a:t>10-01-23</a:t>
             </a:fld>
             <a:endParaRPr lang="fr-BE"/>
           </a:p>
@@ -1523,7 +1523,7 @@
           <a:p>
             <a:fld id="{47F13D19-8A6F-448B-8613-9530819FB28C}" type="datetimeFigureOut">
               <a:rPr lang="fr-BE" smtClean="0"/>
-              <a:t>05-01-23</a:t>
+              <a:t>10-01-23</a:t>
             </a:fld>
             <a:endParaRPr lang="fr-BE"/>
           </a:p>
@@ -1791,7 +1791,7 @@
           <a:p>
             <a:fld id="{47F13D19-8A6F-448B-8613-9530819FB28C}" type="datetimeFigureOut">
               <a:rPr lang="fr-BE" smtClean="0"/>
-              <a:t>05-01-23</a:t>
+              <a:t>10-01-23</a:t>
             </a:fld>
             <a:endParaRPr lang="fr-BE"/>
           </a:p>
@@ -2206,7 +2206,7 @@
           <a:p>
             <a:fld id="{47F13D19-8A6F-448B-8613-9530819FB28C}" type="datetimeFigureOut">
               <a:rPr lang="fr-BE" smtClean="0"/>
-              <a:t>05-01-23</a:t>
+              <a:t>10-01-23</a:t>
             </a:fld>
             <a:endParaRPr lang="fr-BE"/>
           </a:p>
@@ -2348,7 +2348,7 @@
           <a:p>
             <a:fld id="{47F13D19-8A6F-448B-8613-9530819FB28C}" type="datetimeFigureOut">
               <a:rPr lang="fr-BE" smtClean="0"/>
-              <a:t>05-01-23</a:t>
+              <a:t>10-01-23</a:t>
             </a:fld>
             <a:endParaRPr lang="fr-BE"/>
           </a:p>
@@ -2461,7 +2461,7 @@
           <a:p>
             <a:fld id="{47F13D19-8A6F-448B-8613-9530819FB28C}" type="datetimeFigureOut">
               <a:rPr lang="fr-BE" smtClean="0"/>
-              <a:t>05-01-23</a:t>
+              <a:t>10-01-23</a:t>
             </a:fld>
             <a:endParaRPr lang="fr-BE"/>
           </a:p>
@@ -2774,7 +2774,7 @@
           <a:p>
             <a:fld id="{47F13D19-8A6F-448B-8613-9530819FB28C}" type="datetimeFigureOut">
               <a:rPr lang="fr-BE" smtClean="0"/>
-              <a:t>05-01-23</a:t>
+              <a:t>10-01-23</a:t>
             </a:fld>
             <a:endParaRPr lang="fr-BE"/>
           </a:p>
@@ -3063,7 +3063,7 @@
           <a:p>
             <a:fld id="{47F13D19-8A6F-448B-8613-9530819FB28C}" type="datetimeFigureOut">
               <a:rPr lang="fr-BE" smtClean="0"/>
-              <a:t>05-01-23</a:t>
+              <a:t>10-01-23</a:t>
             </a:fld>
             <a:endParaRPr lang="fr-BE"/>
           </a:p>
@@ -3306,7 +3306,7 @@
           <a:p>
             <a:fld id="{47F13D19-8A6F-448B-8613-9530819FB28C}" type="datetimeFigureOut">
               <a:rPr lang="fr-BE" smtClean="0"/>
-              <a:t>05-01-23</a:t>
+              <a:t>10-01-23</a:t>
             </a:fld>
             <a:endParaRPr lang="fr-BE"/>
           </a:p>
@@ -11290,7 +11290,19 @@
           <a:p>
             <a:r>
               <a:rPr lang="en-GB" dirty="0"/>
-              <a:t>Select all players (id, name, </a:t>
+              <a:t>Select all players (id, </a:t>
+            </a:r>
+            <a:r>
+              <a:rPr lang="en-GB" dirty="0" err="1"/>
+              <a:t>last</a:t>
+            </a:r>
+            <a:r>
+              <a:rPr lang="en-GB" err="1"/>
+              <a:t>_</a:t>
+            </a:r>
+            <a:r>
+              <a:rPr lang="en-GB"/>
+              <a:t>name, </a:t>
             </a:r>
             <a:r>
               <a:rPr lang="en-GB" dirty="0" err="1"/>
@@ -11312,25 +11324,33 @@
           <a:p>
             <a:r>
               <a:rPr lang="en-GB" dirty="0"/>
-              <a:t>Select only the players with a name starting by ‘A’</a:t>
-            </a:r>
-          </a:p>
-          <a:p>
+              <a:t>Select only the players with a </a:t>
+            </a:r>
+            <a:r>
+              <a:rPr lang="en-GB" dirty="0" err="1"/>
+              <a:t>last_name</a:t>
+            </a:r>
             <a:r>
               <a:rPr lang="en-GB" dirty="0"/>
-              <a:t>Select only the players with a ‘a’ inside their name</a:t>
+              <a:t> starting by ‘A’</a:t>
             </a:r>
           </a:p>
           <a:p>
             <a:r>
               <a:rPr lang="en-GB" dirty="0"/>
-              <a:t>Select the players with their team’s name and </a:t>
+              <a:t>Select only the players with a ‘a’ inside their </a:t>
             </a:r>
             <a:r>
               <a:rPr lang="en-GB" dirty="0" err="1"/>
-              <a:t>color</a:t>
+              <a:t>last_name</a:t>
             </a:r>
             <a:endParaRPr lang="en-GB" dirty="0"/>
+          </a:p>
+          <a:p>
+            <a:r>
+              <a:rPr lang="en-GB" dirty="0"/>
+              <a:t>Select the players with their team’s name.</a:t>
+            </a:r>
           </a:p>
           <a:p>
             <a:r>
@@ -12018,9 +12038,12 @@
               <a:rPr lang="fr-FR" sz="1800" dirty="0">
                 <a:hlinkClick r:id="rId2"/>
               </a:rPr>
-              <a:t>https://gist.github.com/zeemil/02b1125adbfe5261898661e2ab2dbfee</a:t>
-            </a:r>
-            <a:endParaRPr lang="fr-FR" sz="1800" dirty="0"/>
+              <a:t>https://github.com/zeemil/ecoleit-1sql/blob/main/laragon/packages.conf</a:t>
+            </a:r>
+            <a:r>
+              <a:rPr lang="fr-FR" sz="1800" dirty="0"/>
+              <a:t> </a:t>
+            </a:r>
           </a:p>
           <a:p>
             <a:r>
@@ -12033,15 +12056,7 @@
             </a:r>
             <a:r>
               <a:rPr lang="fr-FR" sz="2400" dirty="0"/>
-              <a:t>, </a:t>
-            </a:r>
-            <a:r>
-              <a:rPr lang="fr-FR" sz="2400" dirty="0" err="1"/>
-              <a:t>MariaDB</a:t>
-            </a:r>
-            <a:r>
-              <a:rPr lang="fr-FR" sz="2400" dirty="0"/>
-              <a:t> et Python-3.6 depuis le</a:t>
+              <a:t>, mysql-8.0 et Python-3.6 depuis le</a:t>
             </a:r>
             <a:br>
               <a:rPr lang="fr-FR" sz="2400" dirty="0"/>
@@ -12059,23 +12074,16 @@
           <a:p>
             <a:r>
               <a:rPr lang="fr-FR" sz="2400" dirty="0"/>
-              <a:t>Aller dans Menu -&gt; </a:t>
-            </a:r>
-            <a:r>
-              <a:rPr lang="fr-FR" sz="2400" dirty="0" err="1"/>
-              <a:t>MariaDB</a:t>
-            </a:r>
-            <a:r>
-              <a:rPr lang="fr-FR" sz="2400" dirty="0"/>
-              <a:t> (ou MySQL) -&gt; Version et </a:t>
+              <a:t>Aller dans Menu -&gt; MySQL -&gt; Version et </a:t>
             </a:r>
             <a:br>
               <a:rPr lang="fr-FR" sz="2400" dirty="0"/>
             </a:br>
             <a:r>
-              <a:rPr lang="fr-FR" sz="2400" dirty="0"/>
-              <a:t>choisir Mariadb-10.9.3-winx64</a:t>
-            </a:r>
+              <a:rPr lang="fr-FR" sz="2400"/>
+              <a:t>choisir mysql-8.0</a:t>
+            </a:r>
+            <a:endParaRPr lang="fr-FR" sz="2400" dirty="0"/>
           </a:p>
           <a:p>
             <a:endParaRPr lang="fr-FR" sz="2400" dirty="0"/>

</xml_diff>

<commit_message>
all exercices in queries.sql and PPTX corrections
</commit_message>
<xml_diff>
--- a/02 - Exercices SQL.pptx
+++ b/02 - Exercices SQL.pptx
@@ -220,7 +220,7 @@
           <a:p>
             <a:fld id="{5E73C5D7-919D-4BDD-AE43-DC3A70FDFE9F}" type="datetimeFigureOut">
               <a:rPr lang="fr-BE" smtClean="0"/>
-              <a:t>10-01-23</a:t>
+              <a:t>12-01-23</a:t>
             </a:fld>
             <a:endParaRPr lang="fr-BE"/>
           </a:p>
@@ -637,7 +637,7 @@
           <a:p>
             <a:fld id="{47F13D19-8A6F-448B-8613-9530819FB28C}" type="datetimeFigureOut">
               <a:rPr lang="fr-BE" smtClean="0"/>
-              <a:t>10-01-23</a:t>
+              <a:t>12-01-23</a:t>
             </a:fld>
             <a:endParaRPr lang="fr-BE"/>
           </a:p>
@@ -837,7 +837,7 @@
           <a:p>
             <a:fld id="{47F13D19-8A6F-448B-8613-9530819FB28C}" type="datetimeFigureOut">
               <a:rPr lang="fr-BE" smtClean="0"/>
-              <a:t>10-01-23</a:t>
+              <a:t>12-01-23</a:t>
             </a:fld>
             <a:endParaRPr lang="fr-BE"/>
           </a:p>
@@ -1047,7 +1047,7 @@
           <a:p>
             <a:fld id="{47F13D19-8A6F-448B-8613-9530819FB28C}" type="datetimeFigureOut">
               <a:rPr lang="fr-BE" smtClean="0"/>
-              <a:t>10-01-23</a:t>
+              <a:t>12-01-23</a:t>
             </a:fld>
             <a:endParaRPr lang="fr-BE"/>
           </a:p>
@@ -1247,7 +1247,7 @@
           <a:p>
             <a:fld id="{47F13D19-8A6F-448B-8613-9530819FB28C}" type="datetimeFigureOut">
               <a:rPr lang="fr-BE" smtClean="0"/>
-              <a:t>10-01-23</a:t>
+              <a:t>12-01-23</a:t>
             </a:fld>
             <a:endParaRPr lang="fr-BE"/>
           </a:p>
@@ -1523,7 +1523,7 @@
           <a:p>
             <a:fld id="{47F13D19-8A6F-448B-8613-9530819FB28C}" type="datetimeFigureOut">
               <a:rPr lang="fr-BE" smtClean="0"/>
-              <a:t>10-01-23</a:t>
+              <a:t>12-01-23</a:t>
             </a:fld>
             <a:endParaRPr lang="fr-BE"/>
           </a:p>
@@ -1791,7 +1791,7 @@
           <a:p>
             <a:fld id="{47F13D19-8A6F-448B-8613-9530819FB28C}" type="datetimeFigureOut">
               <a:rPr lang="fr-BE" smtClean="0"/>
-              <a:t>10-01-23</a:t>
+              <a:t>12-01-23</a:t>
             </a:fld>
             <a:endParaRPr lang="fr-BE"/>
           </a:p>
@@ -2206,7 +2206,7 @@
           <a:p>
             <a:fld id="{47F13D19-8A6F-448B-8613-9530819FB28C}" type="datetimeFigureOut">
               <a:rPr lang="fr-BE" smtClean="0"/>
-              <a:t>10-01-23</a:t>
+              <a:t>12-01-23</a:t>
             </a:fld>
             <a:endParaRPr lang="fr-BE"/>
           </a:p>
@@ -2348,7 +2348,7 @@
           <a:p>
             <a:fld id="{47F13D19-8A6F-448B-8613-9530819FB28C}" type="datetimeFigureOut">
               <a:rPr lang="fr-BE" smtClean="0"/>
-              <a:t>10-01-23</a:t>
+              <a:t>12-01-23</a:t>
             </a:fld>
             <a:endParaRPr lang="fr-BE"/>
           </a:p>
@@ -2461,7 +2461,7 @@
           <a:p>
             <a:fld id="{47F13D19-8A6F-448B-8613-9530819FB28C}" type="datetimeFigureOut">
               <a:rPr lang="fr-BE" smtClean="0"/>
-              <a:t>10-01-23</a:t>
+              <a:t>12-01-23</a:t>
             </a:fld>
             <a:endParaRPr lang="fr-BE"/>
           </a:p>
@@ -2774,7 +2774,7 @@
           <a:p>
             <a:fld id="{47F13D19-8A6F-448B-8613-9530819FB28C}" type="datetimeFigureOut">
               <a:rPr lang="fr-BE" smtClean="0"/>
-              <a:t>10-01-23</a:t>
+              <a:t>12-01-23</a:t>
             </a:fld>
             <a:endParaRPr lang="fr-BE"/>
           </a:p>
@@ -3063,7 +3063,7 @@
           <a:p>
             <a:fld id="{47F13D19-8A6F-448B-8613-9530819FB28C}" type="datetimeFigureOut">
               <a:rPr lang="fr-BE" smtClean="0"/>
-              <a:t>10-01-23</a:t>
+              <a:t>12-01-23</a:t>
             </a:fld>
             <a:endParaRPr lang="fr-BE"/>
           </a:p>
@@ -3306,7 +3306,7 @@
           <a:p>
             <a:fld id="{47F13D19-8A6F-448B-8613-9530819FB28C}" type="datetimeFigureOut">
               <a:rPr lang="fr-BE" smtClean="0"/>
-              <a:t>10-01-23</a:t>
+              <a:t>12-01-23</a:t>
             </a:fld>
             <a:endParaRPr lang="fr-BE"/>
           </a:p>
@@ -11294,15 +11294,11 @@
             </a:r>
             <a:r>
               <a:rPr lang="en-GB" dirty="0" err="1"/>
-              <a:t>last</a:t>
-            </a:r>
-            <a:r>
-              <a:rPr lang="en-GB" err="1"/>
-              <a:t>_</a:t>
-            </a:r>
-            <a:r>
-              <a:rPr lang="en-GB"/>
-              <a:t>name, </a:t>
+              <a:t>last_name</a:t>
+            </a:r>
+            <a:r>
+              <a:rPr lang="en-GB" dirty="0"/>
+              <a:t>, </a:t>
             </a:r>
             <a:r>
               <a:rPr lang="en-GB" dirty="0" err="1"/>
@@ -11574,11 +11570,11 @@
           <a:p>
             <a:r>
               <a:rPr lang="fr-FR" dirty="0"/>
-              <a:t>The ‘</a:t>
+              <a:t>The ‘Team </a:t>
             </a:r>
             <a:r>
               <a:rPr lang="fr-FR" dirty="0" err="1"/>
-              <a:t>red</a:t>
+              <a:t>Liquid</a:t>
             </a:r>
             <a:r>
               <a:rPr lang="fr-FR" dirty="0"/>
@@ -11601,12 +11597,12 @@
               <a:t> the ‘</a:t>
             </a:r>
             <a:r>
-              <a:rPr lang="fr-FR" dirty="0" err="1"/>
-              <a:t>pink</a:t>
+              <a:rPr lang="fr-FR"/>
+              <a:t>Team Solid’ </a:t>
             </a:r>
             <a:r>
               <a:rPr lang="fr-FR" dirty="0"/>
-              <a:t>’ team</a:t>
+              <a:t>team</a:t>
             </a:r>
           </a:p>
           <a:p>

</xml_diff>